<commit_message>
User name display correctly
</commit_message>
<xml_diff>
--- a/documentation/presentation/Präsentation_Using_Cloud_Services.pptx
+++ b/documentation/presentation/Präsentation_Using_Cloud_Services.pptx
@@ -214,7 +214,7 @@
           <a:p>
             <a:fld id="{B3654C23-CE4E-42B1-99EC-1DAD68CD7927}" type="datetimeFigureOut">
               <a:rPr lang="de-DE" smtClean="0"/>
-              <a:t>08.05.2019</a:t>
+              <a:t>15.05.2019</a:t>
             </a:fld>
             <a:endParaRPr lang="de-DE"/>
           </a:p>
@@ -846,7 +846,330 @@
               <a:buFont typeface="Arial" panose="020B0604020202020204" pitchFamily="34" charset="0"/>
               <a:buNone/>
             </a:pPr>
-            <a:endParaRPr lang="de-DE" dirty="0"/>
+            <a:r>
+              <a:rPr lang="de-DE" dirty="0"/>
+              <a:t>CSP &amp; Angular: </a:t>
+            </a:r>
+            <a:r>
+              <a:rPr lang="de-DE" dirty="0" err="1"/>
+              <a:t>Since</a:t>
+            </a:r>
+            <a:r>
+              <a:rPr lang="de-DE" dirty="0"/>
+              <a:t> Angular </a:t>
+            </a:r>
+            <a:r>
+              <a:rPr lang="de-DE" dirty="0" err="1"/>
+              <a:t>is</a:t>
+            </a:r>
+            <a:r>
+              <a:rPr lang="de-DE" dirty="0"/>
+              <a:t> </a:t>
+            </a:r>
+            <a:r>
+              <a:rPr lang="de-DE" dirty="0" err="1"/>
+              <a:t>bootstrapped</a:t>
+            </a:r>
+            <a:r>
+              <a:rPr lang="de-DE" dirty="0"/>
+              <a:t> in </a:t>
+            </a:r>
+            <a:r>
+              <a:rPr lang="de-DE" dirty="0" err="1"/>
+              <a:t>the</a:t>
+            </a:r>
+            <a:r>
+              <a:rPr lang="de-DE" dirty="0"/>
+              <a:t> </a:t>
+            </a:r>
+            <a:r>
+              <a:rPr lang="de-DE" dirty="0" err="1"/>
+              <a:t>browser</a:t>
+            </a:r>
+            <a:r>
+              <a:rPr lang="de-DE" dirty="0"/>
+              <a:t> via an inline </a:t>
+            </a:r>
+            <a:r>
+              <a:rPr lang="de-DE" dirty="0" err="1"/>
+              <a:t>script</a:t>
+            </a:r>
+            <a:r>
+              <a:rPr lang="de-DE" dirty="0"/>
+              <a:t> tag </a:t>
+            </a:r>
+            <a:r>
+              <a:rPr lang="de-DE" dirty="0" err="1"/>
+              <a:t>while</a:t>
+            </a:r>
+            <a:r>
+              <a:rPr lang="de-DE" dirty="0"/>
+              <a:t> </a:t>
+            </a:r>
+            <a:r>
+              <a:rPr lang="de-DE" dirty="0" err="1"/>
+              <a:t>loading</a:t>
+            </a:r>
+            <a:r>
+              <a:rPr lang="de-DE" dirty="0"/>
+              <a:t> </a:t>
+            </a:r>
+            <a:r>
+              <a:rPr lang="de-DE" dirty="0" err="1"/>
+              <a:t>the</a:t>
+            </a:r>
+            <a:r>
+              <a:rPr lang="de-DE" dirty="0"/>
+              <a:t> index.html. </a:t>
+            </a:r>
+            <a:r>
+              <a:rPr lang="de-DE" dirty="0" err="1"/>
+              <a:t>It</a:t>
+            </a:r>
+            <a:r>
+              <a:rPr lang="de-DE" dirty="0"/>
+              <a:t> </a:t>
+            </a:r>
+            <a:r>
+              <a:rPr lang="de-DE" dirty="0" err="1"/>
+              <a:t>is</a:t>
+            </a:r>
+            <a:r>
+              <a:rPr lang="de-DE" dirty="0"/>
+              <a:t> </a:t>
+            </a:r>
+            <a:r>
+              <a:rPr lang="de-DE" dirty="0" err="1"/>
+              <a:t>necessary</a:t>
+            </a:r>
+            <a:r>
+              <a:rPr lang="de-DE" dirty="0"/>
+              <a:t> </a:t>
+            </a:r>
+            <a:r>
+              <a:rPr lang="de-DE" dirty="0" err="1"/>
+              <a:t>to</a:t>
+            </a:r>
+            <a:r>
+              <a:rPr lang="de-DE" dirty="0"/>
+              <a:t> </a:t>
+            </a:r>
+            <a:r>
+              <a:rPr lang="de-DE" dirty="0" err="1"/>
+              <a:t>allow</a:t>
+            </a:r>
+            <a:r>
+              <a:rPr lang="de-DE" dirty="0"/>
+              <a:t> </a:t>
+            </a:r>
+            <a:r>
+              <a:rPr lang="de-DE" dirty="0" err="1"/>
+              <a:t>this</a:t>
+            </a:r>
+            <a:r>
+              <a:rPr lang="de-DE" dirty="0"/>
+              <a:t> in </a:t>
+            </a:r>
+            <a:r>
+              <a:rPr lang="de-DE" dirty="0" err="1"/>
+              <a:t>the</a:t>
+            </a:r>
+            <a:r>
+              <a:rPr lang="de-DE" dirty="0"/>
+              <a:t> Content Security Policy. This </a:t>
+            </a:r>
+            <a:r>
+              <a:rPr lang="de-DE" dirty="0" err="1"/>
+              <a:t>is</a:t>
+            </a:r>
+            <a:r>
+              <a:rPr lang="de-DE" dirty="0"/>
+              <a:t> </a:t>
+            </a:r>
+            <a:r>
+              <a:rPr lang="de-DE" dirty="0" err="1"/>
+              <a:t>could</a:t>
+            </a:r>
+            <a:r>
+              <a:rPr lang="de-DE" dirty="0"/>
+              <a:t> </a:t>
+            </a:r>
+            <a:r>
+              <a:rPr lang="de-DE" dirty="0" err="1"/>
+              <a:t>be</a:t>
+            </a:r>
+            <a:r>
+              <a:rPr lang="de-DE" dirty="0"/>
+              <a:t> a possible </a:t>
+            </a:r>
+            <a:r>
+              <a:rPr lang="de-DE" dirty="0" err="1"/>
+              <a:t>security</a:t>
+            </a:r>
+            <a:r>
+              <a:rPr lang="de-DE" dirty="0"/>
+              <a:t> </a:t>
+            </a:r>
+            <a:r>
+              <a:rPr lang="de-DE" dirty="0" err="1"/>
+              <a:t>issue</a:t>
+            </a:r>
+            <a:r>
+              <a:rPr lang="de-DE" dirty="0"/>
+              <a:t> and </a:t>
+            </a:r>
+            <a:r>
+              <a:rPr lang="de-DE" dirty="0" err="1"/>
+              <a:t>as</a:t>
+            </a:r>
+            <a:r>
+              <a:rPr lang="de-DE" dirty="0"/>
+              <a:t> a </a:t>
+            </a:r>
+            <a:r>
+              <a:rPr lang="de-DE" dirty="0" err="1"/>
+              <a:t>result</a:t>
+            </a:r>
+            <a:r>
+              <a:rPr lang="de-DE" dirty="0"/>
+              <a:t> </a:t>
+            </a:r>
+            <a:r>
+              <a:rPr lang="de-DE" dirty="0" err="1"/>
+              <a:t>this</a:t>
+            </a:r>
+            <a:r>
+              <a:rPr lang="de-DE" dirty="0"/>
+              <a:t> </a:t>
+            </a:r>
+            <a:r>
+              <a:rPr lang="de-DE" dirty="0" err="1"/>
+              <a:t>is</a:t>
+            </a:r>
+            <a:r>
+              <a:rPr lang="de-DE" dirty="0"/>
+              <a:t> </a:t>
+            </a:r>
+            <a:r>
+              <a:rPr lang="de-DE" dirty="0" err="1"/>
+              <a:t>usually</a:t>
+            </a:r>
+            <a:r>
+              <a:rPr lang="de-DE" dirty="0"/>
+              <a:t> </a:t>
+            </a:r>
+            <a:r>
+              <a:rPr lang="de-DE" dirty="0" err="1"/>
+              <a:t>forbidden</a:t>
+            </a:r>
+            <a:r>
+              <a:rPr lang="de-DE" dirty="0"/>
+              <a:t> </a:t>
+            </a:r>
+            <a:r>
+              <a:rPr lang="de-DE" dirty="0" err="1"/>
+              <a:t>by</a:t>
+            </a:r>
+            <a:r>
+              <a:rPr lang="de-DE" dirty="0"/>
+              <a:t> </a:t>
+            </a:r>
+            <a:r>
+              <a:rPr lang="de-DE" dirty="0" err="1"/>
+              <a:t>most</a:t>
+            </a:r>
+            <a:r>
+              <a:rPr lang="de-DE" dirty="0"/>
+              <a:t> Content Security </a:t>
+            </a:r>
+            <a:r>
+              <a:rPr lang="de-DE" dirty="0" err="1"/>
+              <a:t>Policies</a:t>
+            </a:r>
+            <a:r>
+              <a:rPr lang="de-DE" dirty="0"/>
+              <a:t>. </a:t>
+            </a:r>
+            <a:r>
+              <a:rPr lang="de-DE" dirty="0" err="1"/>
+              <a:t>Since</a:t>
+            </a:r>
+            <a:r>
+              <a:rPr lang="de-DE" dirty="0"/>
+              <a:t> </a:t>
+            </a:r>
+            <a:r>
+              <a:rPr lang="de-DE" dirty="0" err="1"/>
+              <a:t>we</a:t>
+            </a:r>
+            <a:r>
+              <a:rPr lang="de-DE" dirty="0"/>
+              <a:t> </a:t>
+            </a:r>
+            <a:r>
+              <a:rPr lang="de-DE" dirty="0" err="1"/>
+              <a:t>need</a:t>
+            </a:r>
+            <a:r>
+              <a:rPr lang="de-DE" dirty="0"/>
+              <a:t> </a:t>
+            </a:r>
+            <a:r>
+              <a:rPr lang="de-DE" dirty="0" err="1"/>
+              <a:t>to</a:t>
+            </a:r>
+            <a:r>
+              <a:rPr lang="de-DE" dirty="0"/>
+              <a:t> </a:t>
+            </a:r>
+            <a:r>
+              <a:rPr lang="de-DE" dirty="0" err="1"/>
+              <a:t>explicitly</a:t>
+            </a:r>
+            <a:r>
+              <a:rPr lang="de-DE" dirty="0"/>
+              <a:t> </a:t>
+            </a:r>
+            <a:r>
+              <a:rPr lang="de-DE" dirty="0" err="1"/>
+              <a:t>enable</a:t>
+            </a:r>
+            <a:r>
+              <a:rPr lang="de-DE" dirty="0"/>
+              <a:t> </a:t>
+            </a:r>
+            <a:r>
+              <a:rPr lang="de-DE" dirty="0" err="1"/>
+              <a:t>this</a:t>
+            </a:r>
+            <a:r>
+              <a:rPr lang="de-DE" dirty="0"/>
+              <a:t> </a:t>
+            </a:r>
+            <a:r>
+              <a:rPr lang="de-DE" dirty="0" err="1"/>
+              <a:t>we</a:t>
+            </a:r>
+            <a:r>
+              <a:rPr lang="de-DE" dirty="0"/>
+              <a:t> </a:t>
+            </a:r>
+            <a:r>
+              <a:rPr lang="de-DE" dirty="0" err="1"/>
+              <a:t>receive</a:t>
+            </a:r>
+            <a:r>
+              <a:rPr lang="de-DE" dirty="0"/>
+              <a:t> a </a:t>
+            </a:r>
+            <a:r>
+              <a:rPr lang="de-DE" dirty="0" err="1"/>
+              <a:t>worse</a:t>
+            </a:r>
+            <a:r>
+              <a:rPr lang="de-DE" dirty="0"/>
+              <a:t> score on Mozilla Observatory.</a:t>
+            </a:r>
           </a:p>
         </p:txBody>
       </p:sp>
@@ -1533,7 +1856,7 @@
             <a:fld id="{1E700B27-DE4C-4B9E-BB11-B9027034A00F}" type="datetimeFigureOut">
               <a:rPr lang="en-US" dirty="0"/>
               <a:pPr/>
-              <a:t>5/8/2019</a:t>
+              <a:t>5/15/2019</a:t>
             </a:fld>
             <a:endParaRPr lang="en-US" dirty="0"/>
           </a:p>
@@ -2653,7 +2976,7 @@
           <a:p>
             <a:fld id="{C40F4739-9812-4A9F-890D-2AD6BA5F6EE8}" type="datetimeFigureOut">
               <a:rPr lang="en-US" dirty="0"/>
-              <a:t>5/8/2019</a:t>
+              <a:t>5/15/2019</a:t>
             </a:fld>
             <a:endParaRPr lang="en-US" dirty="0"/>
           </a:p>
@@ -3664,7 +3987,7 @@
           <a:p>
             <a:fld id="{18845AC5-A3F8-44AA-BA8F-596CDCC976D3}" type="datetimeFigureOut">
               <a:rPr lang="en-US" dirty="0"/>
-              <a:t>5/8/2019</a:t>
+              <a:t>5/15/2019</a:t>
             </a:fld>
             <a:endParaRPr lang="en-US" dirty="0"/>
           </a:p>
@@ -4834,7 +5157,7 @@
           <a:p>
             <a:fld id="{C873B183-A821-4095-A363-9EC968635539}" type="datetimeFigureOut">
               <a:rPr lang="en-US" dirty="0"/>
-              <a:t>5/8/2019</a:t>
+              <a:t>5/15/2019</a:t>
             </a:fld>
             <a:endParaRPr lang="en-US" dirty="0"/>
           </a:p>
@@ -5895,7 +6218,7 @@
           <a:p>
             <a:fld id="{174D01B4-0AA5-45E6-B2E6-5FA4078AEBCF}" type="datetimeFigureOut">
               <a:rPr lang="en-US" dirty="0"/>
-              <a:t>5/8/2019</a:t>
+              <a:t>5/15/2019</a:t>
             </a:fld>
             <a:endParaRPr lang="en-US" dirty="0"/>
           </a:p>
@@ -6541,7 +6864,7 @@
           <a:p>
             <a:fld id="{4147335C-0450-40D7-8612-B3203BED4F28}" type="datetimeFigureOut">
               <a:rPr lang="en-US" dirty="0"/>
-              <a:t>5/8/2019</a:t>
+              <a:t>5/15/2019</a:t>
             </a:fld>
             <a:endParaRPr lang="en-US" dirty="0"/>
           </a:p>
@@ -7388,7 +7711,7 @@
           <a:p>
             <a:fld id="{D246A105-2A1C-4284-B4EA-07CF89B1A393}" type="datetimeFigureOut">
               <a:rPr lang="en-US" dirty="0"/>
-              <a:t>5/8/2019</a:t>
+              <a:t>5/15/2019</a:t>
             </a:fld>
             <a:endParaRPr lang="en-US" dirty="0"/>
           </a:p>
@@ -7563,7 +7886,7 @@
           <a:p>
             <a:fld id="{80DBE609-F3F2-45E6-BD6A-E03A8C86C1AE}" type="datetimeFigureOut">
               <a:rPr lang="en-US" dirty="0"/>
-              <a:t>5/8/2019</a:t>
+              <a:t>5/15/2019</a:t>
             </a:fld>
             <a:endParaRPr lang="en-US" dirty="0"/>
           </a:p>
@@ -8561,7 +8884,7 @@
           <a:p>
             <a:fld id="{7A24AD68-089C-4467-A8F3-EA2BBCA6B44E}" type="datetimeFigureOut">
               <a:rPr lang="en-US" dirty="0"/>
-              <a:t>5/8/2019</a:t>
+              <a:t>5/15/2019</a:t>
             </a:fld>
             <a:endParaRPr lang="en-US" dirty="0"/>
           </a:p>
@@ -8767,7 +9090,7 @@
           <a:p>
             <a:fld id="{75C51FCE-E4BB-4680-8E50-3C0E348D2609}" type="datetimeFigureOut">
               <a:rPr lang="en-US" dirty="0"/>
-              <a:t>5/8/2019</a:t>
+              <a:t>5/15/2019</a:t>
             </a:fld>
             <a:endParaRPr lang="en-US" dirty="0"/>
           </a:p>
@@ -9829,7 +10152,7 @@
           <a:p>
             <a:fld id="{8AAA073D-A903-47F8-8D16-77642FB0DF1F}" type="datetimeFigureOut">
               <a:rPr lang="en-US" dirty="0"/>
-              <a:t>5/8/2019</a:t>
+              <a:t>5/15/2019</a:t>
             </a:fld>
             <a:endParaRPr lang="en-US" dirty="0"/>
           </a:p>
@@ -10101,7 +10424,7 @@
           <a:p>
             <a:fld id="{AB91FA40-626B-4CA1-85D0-7A9016E395BA}" type="datetimeFigureOut">
               <a:rPr lang="en-US" dirty="0"/>
-              <a:t>5/8/2019</a:t>
+              <a:t>5/15/2019</a:t>
             </a:fld>
             <a:endParaRPr lang="en-US" dirty="0"/>
           </a:p>
@@ -10483,7 +10806,7 @@
           <a:p>
             <a:fld id="{C3F425EA-B9DC-48A7-991E-9A82573B1B21}" type="datetimeFigureOut">
               <a:rPr lang="en-US" dirty="0"/>
-              <a:t>5/8/2019</a:t>
+              <a:t>5/15/2019</a:t>
             </a:fld>
             <a:endParaRPr lang="en-US" dirty="0"/>
           </a:p>
@@ -10601,7 +10924,7 @@
           <a:p>
             <a:fld id="{66CB97F8-6CEB-469B-AFCC-889F2A2B1D5A}" type="datetimeFigureOut">
               <a:rPr lang="en-US" dirty="0"/>
-              <a:t>5/8/2019</a:t>
+              <a:t>5/15/2019</a:t>
             </a:fld>
             <a:endParaRPr lang="en-US" dirty="0"/>
           </a:p>
@@ -10696,7 +11019,7 @@
           <a:p>
             <a:fld id="{8FA9179F-009E-4FA5-B091-7EBB82A185BD}" type="datetimeFigureOut">
               <a:rPr lang="en-US" dirty="0"/>
-              <a:t>5/8/2019</a:t>
+              <a:t>5/15/2019</a:t>
             </a:fld>
             <a:endParaRPr lang="en-US" dirty="0"/>
           </a:p>
@@ -11805,7 +12128,7 @@
           <a:p>
             <a:fld id="{8E665CEB-0076-4E37-B880-BCEA9784DE0A}" type="datetimeFigureOut">
               <a:rPr lang="en-US" dirty="0"/>
-              <a:t>5/8/2019</a:t>
+              <a:t>5/15/2019</a:t>
             </a:fld>
             <a:endParaRPr lang="en-US" dirty="0"/>
           </a:p>
@@ -12938,7 +13261,7 @@
           <a:p>
             <a:fld id="{A6149E5E-3896-4118-99A7-7B85668F1C5E}" type="datetimeFigureOut">
               <a:rPr lang="en-US" dirty="0"/>
-              <a:t>5/8/2019</a:t>
+              <a:t>5/15/2019</a:t>
             </a:fld>
             <a:endParaRPr lang="en-US" dirty="0"/>
           </a:p>
@@ -13966,7 +14289,7 @@
           <a:p>
             <a:fld id="{7E0D914D-B099-4142-A885-11F276715148}" type="datetimeFigureOut">
               <a:rPr lang="en-US" dirty="0"/>
-              <a:t>5/8/2019</a:t>
+              <a:t>5/15/2019</a:t>
             </a:fld>
             <a:endParaRPr lang="en-US" dirty="0"/>
           </a:p>

</xml_diff>

<commit_message>
2 Aspekt for (What we learn) in Prasentation
</commit_message>
<xml_diff>
--- a/documentation/presentation/Präsentation_Using_Cloud_Services.pptx
+++ b/documentation/presentation/Präsentation_Using_Cloud_Services.pptx
@@ -214,7 +214,7 @@
           <a:p>
             <a:fld id="{B3654C23-CE4E-42B1-99EC-1DAD68CD7927}" type="datetimeFigureOut">
               <a:rPr lang="de-DE" smtClean="0"/>
-              <a:t>15.05.2019</a:t>
+              <a:t>22.05.2019</a:t>
             </a:fld>
             <a:endParaRPr lang="de-DE"/>
           </a:p>
@@ -848,7 +848,17 @@
             </a:pPr>
             <a:r>
               <a:rPr lang="de-DE" dirty="0"/>
-              <a:t>CSP &amp; Angular: </a:t>
+              <a:t>1) CSP &amp; Angular:</a:t>
+            </a:r>
+          </a:p>
+          <a:p>
+            <a:pPr marL="0" indent="0">
+              <a:buFont typeface="Arial" panose="020B0604020202020204" pitchFamily="34" charset="0"/>
+              <a:buNone/>
+            </a:pPr>
+            <a:r>
+              <a:rPr lang="de-DE" dirty="0"/>
+              <a:t> </a:t>
             </a:r>
             <a:r>
               <a:rPr lang="de-DE" dirty="0" err="1"/>
@@ -1170,6 +1180,95 @@
               <a:rPr lang="de-DE" dirty="0"/>
               <a:t> score on Mozilla Observatory.</a:t>
             </a:r>
+          </a:p>
+          <a:p>
+            <a:pPr marL="0" indent="0">
+              <a:buFont typeface="Arial" panose="020B0604020202020204" pitchFamily="34" charset="0"/>
+              <a:buNone/>
+            </a:pPr>
+            <a:endParaRPr lang="de-DE" dirty="0"/>
+          </a:p>
+          <a:p>
+            <a:pPr marL="0" indent="0">
+              <a:buFont typeface="Arial" panose="020B0604020202020204" pitchFamily="34" charset="0"/>
+              <a:buNone/>
+            </a:pPr>
+            <a:r>
+              <a:rPr lang="de-DE" dirty="0"/>
+              <a:t>2) </a:t>
+            </a:r>
+            <a:r>
+              <a:rPr lang="en-US" dirty="0"/>
+              <a:t>Events focus/blur</a:t>
+            </a:r>
+          </a:p>
+          <a:p>
+            <a:pPr marL="0" indent="0">
+              <a:buFont typeface="Arial" panose="020B0604020202020204" pitchFamily="34" charset="0"/>
+              <a:buNone/>
+            </a:pPr>
+            <a:r>
+              <a:rPr lang="en-US" dirty="0"/>
+              <a:t>The focus event is called on focusing, and blur – when the element loses the focus. Let’s use them for validation of an input field. An element receives a focus when the user clicks on it. Focusing generally means: “prepare to accept the data here”. The moment of losing the focus (“blur”) can be even more important. That’s when a user clicks somewhere else to go to the next form field. Losing the focus generally means: “the data has been entered”, so we can run the code to check it or even to save it to the server and so on.</a:t>
+            </a:r>
+          </a:p>
+          <a:p>
+            <a:pPr marL="0" indent="0">
+              <a:buFont typeface="Arial" panose="020B0604020202020204" pitchFamily="34" charset="0"/>
+              <a:buNone/>
+            </a:pPr>
+            <a:r>
+              <a:rPr lang="en-US" dirty="0"/>
+              <a:t>For example, how we use it in our chat login </a:t>
+            </a:r>
+            <a:r>
+              <a:rPr lang="en-US" dirty="0" err="1"/>
+              <a:t>page:The</a:t>
+            </a:r>
+            <a:r>
+              <a:rPr lang="en-US" dirty="0"/>
+              <a:t> Method </a:t>
+            </a:r>
+            <a:r>
+              <a:rPr lang="en-US" dirty="0" err="1"/>
+              <a:t>onFocus</a:t>
+            </a:r>
+            <a:r>
+              <a:rPr lang="en-US" dirty="0"/>
+              <a:t>() – When the user clicks on the name or password field, show the message box (accept or not accept </a:t>
+            </a:r>
+            <a:r>
+              <a:rPr lang="en-US"/>
+              <a:t>input). The </a:t>
+            </a:r>
+            <a:r>
+              <a:rPr lang="en-US" dirty="0"/>
+              <a:t>Method </a:t>
+            </a:r>
+            <a:r>
+              <a:rPr lang="en-US" dirty="0" err="1"/>
+              <a:t>onBlur</a:t>
+            </a:r>
+            <a:r>
+              <a:rPr lang="en-US" dirty="0"/>
+              <a:t>()- When the user clicks outside of the name or password field, show the same message box and </a:t>
+            </a:r>
+            <a:r>
+              <a:rPr lang="en-US" dirty="0" err="1"/>
+              <a:t>Loginbutton</a:t>
+            </a:r>
+            <a:r>
+              <a:rPr lang="en-US" dirty="0"/>
+              <a:t> is  either clickable or not.</a:t>
+            </a:r>
+            <a:endParaRPr lang="de-DE" dirty="0"/>
+          </a:p>
+          <a:p>
+            <a:pPr marL="0" indent="0">
+              <a:buFont typeface="Arial" panose="020B0604020202020204" pitchFamily="34" charset="0"/>
+              <a:buNone/>
+            </a:pPr>
+            <a:endParaRPr lang="de-DE" dirty="0"/>
           </a:p>
         </p:txBody>
       </p:sp>
@@ -1856,7 +1955,7 @@
             <a:fld id="{1E700B27-DE4C-4B9E-BB11-B9027034A00F}" type="datetimeFigureOut">
               <a:rPr lang="en-US" dirty="0"/>
               <a:pPr/>
-              <a:t>5/15/2019</a:t>
+              <a:t>5/22/2019</a:t>
             </a:fld>
             <a:endParaRPr lang="en-US" dirty="0"/>
           </a:p>
@@ -2976,7 +3075,7 @@
           <a:p>
             <a:fld id="{C40F4739-9812-4A9F-890D-2AD6BA5F6EE8}" type="datetimeFigureOut">
               <a:rPr lang="en-US" dirty="0"/>
-              <a:t>5/15/2019</a:t>
+              <a:t>5/22/2019</a:t>
             </a:fld>
             <a:endParaRPr lang="en-US" dirty="0"/>
           </a:p>
@@ -3987,7 +4086,7 @@
           <a:p>
             <a:fld id="{18845AC5-A3F8-44AA-BA8F-596CDCC976D3}" type="datetimeFigureOut">
               <a:rPr lang="en-US" dirty="0"/>
-              <a:t>5/15/2019</a:t>
+              <a:t>5/22/2019</a:t>
             </a:fld>
             <a:endParaRPr lang="en-US" dirty="0"/>
           </a:p>
@@ -5157,7 +5256,7 @@
           <a:p>
             <a:fld id="{C873B183-A821-4095-A363-9EC968635539}" type="datetimeFigureOut">
               <a:rPr lang="en-US" dirty="0"/>
-              <a:t>5/15/2019</a:t>
+              <a:t>5/22/2019</a:t>
             </a:fld>
             <a:endParaRPr lang="en-US" dirty="0"/>
           </a:p>
@@ -6218,7 +6317,7 @@
           <a:p>
             <a:fld id="{174D01B4-0AA5-45E6-B2E6-5FA4078AEBCF}" type="datetimeFigureOut">
               <a:rPr lang="en-US" dirty="0"/>
-              <a:t>5/15/2019</a:t>
+              <a:t>5/22/2019</a:t>
             </a:fld>
             <a:endParaRPr lang="en-US" dirty="0"/>
           </a:p>
@@ -6864,7 +6963,7 @@
           <a:p>
             <a:fld id="{4147335C-0450-40D7-8612-B3203BED4F28}" type="datetimeFigureOut">
               <a:rPr lang="en-US" dirty="0"/>
-              <a:t>5/15/2019</a:t>
+              <a:t>5/22/2019</a:t>
             </a:fld>
             <a:endParaRPr lang="en-US" dirty="0"/>
           </a:p>
@@ -7711,7 +7810,7 @@
           <a:p>
             <a:fld id="{D246A105-2A1C-4284-B4EA-07CF89B1A393}" type="datetimeFigureOut">
               <a:rPr lang="en-US" dirty="0"/>
-              <a:t>5/15/2019</a:t>
+              <a:t>5/22/2019</a:t>
             </a:fld>
             <a:endParaRPr lang="en-US" dirty="0"/>
           </a:p>
@@ -7886,7 +7985,7 @@
           <a:p>
             <a:fld id="{80DBE609-F3F2-45E6-BD6A-E03A8C86C1AE}" type="datetimeFigureOut">
               <a:rPr lang="en-US" dirty="0"/>
-              <a:t>5/15/2019</a:t>
+              <a:t>5/22/2019</a:t>
             </a:fld>
             <a:endParaRPr lang="en-US" dirty="0"/>
           </a:p>
@@ -8884,7 +8983,7 @@
           <a:p>
             <a:fld id="{7A24AD68-089C-4467-A8F3-EA2BBCA6B44E}" type="datetimeFigureOut">
               <a:rPr lang="en-US" dirty="0"/>
-              <a:t>5/15/2019</a:t>
+              <a:t>5/22/2019</a:t>
             </a:fld>
             <a:endParaRPr lang="en-US" dirty="0"/>
           </a:p>
@@ -9090,7 +9189,7 @@
           <a:p>
             <a:fld id="{75C51FCE-E4BB-4680-8E50-3C0E348D2609}" type="datetimeFigureOut">
               <a:rPr lang="en-US" dirty="0"/>
-              <a:t>5/15/2019</a:t>
+              <a:t>5/22/2019</a:t>
             </a:fld>
             <a:endParaRPr lang="en-US" dirty="0"/>
           </a:p>
@@ -10152,7 +10251,7 @@
           <a:p>
             <a:fld id="{8AAA073D-A903-47F8-8D16-77642FB0DF1F}" type="datetimeFigureOut">
               <a:rPr lang="en-US" dirty="0"/>
-              <a:t>5/15/2019</a:t>
+              <a:t>5/22/2019</a:t>
             </a:fld>
             <a:endParaRPr lang="en-US" dirty="0"/>
           </a:p>
@@ -10424,7 +10523,7 @@
           <a:p>
             <a:fld id="{AB91FA40-626B-4CA1-85D0-7A9016E395BA}" type="datetimeFigureOut">
               <a:rPr lang="en-US" dirty="0"/>
-              <a:t>5/15/2019</a:t>
+              <a:t>5/22/2019</a:t>
             </a:fld>
             <a:endParaRPr lang="en-US" dirty="0"/>
           </a:p>
@@ -10806,7 +10905,7 @@
           <a:p>
             <a:fld id="{C3F425EA-B9DC-48A7-991E-9A82573B1B21}" type="datetimeFigureOut">
               <a:rPr lang="en-US" dirty="0"/>
-              <a:t>5/15/2019</a:t>
+              <a:t>5/22/2019</a:t>
             </a:fld>
             <a:endParaRPr lang="en-US" dirty="0"/>
           </a:p>
@@ -10924,7 +11023,7 @@
           <a:p>
             <a:fld id="{66CB97F8-6CEB-469B-AFCC-889F2A2B1D5A}" type="datetimeFigureOut">
               <a:rPr lang="en-US" dirty="0"/>
-              <a:t>5/15/2019</a:t>
+              <a:t>5/22/2019</a:t>
             </a:fld>
             <a:endParaRPr lang="en-US" dirty="0"/>
           </a:p>
@@ -11019,7 +11118,7 @@
           <a:p>
             <a:fld id="{8FA9179F-009E-4FA5-B091-7EBB82A185BD}" type="datetimeFigureOut">
               <a:rPr lang="en-US" dirty="0"/>
-              <a:t>5/15/2019</a:t>
+              <a:t>5/22/2019</a:t>
             </a:fld>
             <a:endParaRPr lang="en-US" dirty="0"/>
           </a:p>
@@ -12128,7 +12227,7 @@
           <a:p>
             <a:fld id="{8E665CEB-0076-4E37-B880-BCEA9784DE0A}" type="datetimeFigureOut">
               <a:rPr lang="en-US" dirty="0"/>
-              <a:t>5/15/2019</a:t>
+              <a:t>5/22/2019</a:t>
             </a:fld>
             <a:endParaRPr lang="en-US" dirty="0"/>
           </a:p>
@@ -13261,7 +13360,7 @@
           <a:p>
             <a:fld id="{A6149E5E-3896-4118-99A7-7B85668F1C5E}" type="datetimeFigureOut">
               <a:rPr lang="en-US" dirty="0"/>
-              <a:t>5/15/2019</a:t>
+              <a:t>5/22/2019</a:t>
             </a:fld>
             <a:endParaRPr lang="en-US" dirty="0"/>
           </a:p>
@@ -14289,7 +14388,7 @@
           <a:p>
             <a:fld id="{7E0D914D-B099-4142-A885-11F276715148}" type="datetimeFigureOut">
               <a:rPr lang="en-US" dirty="0"/>
-              <a:t>5/15/2019</a:t>
+              <a:t>5/22/2019</a:t>
             </a:fld>
             <a:endParaRPr lang="en-US" dirty="0"/>
           </a:p>
@@ -15697,6 +15796,50 @@
               <a:rPr lang="en-US" dirty="0"/>
               <a:t>'unsafe-inline' compromises the policy</a:t>
             </a:r>
+            <a:endParaRPr lang="de-DE" dirty="0"/>
+          </a:p>
+          <a:p>
+            <a:pPr marL="457200" lvl="1" indent="0">
+              <a:buNone/>
+            </a:pPr>
+            <a:endParaRPr lang="de-DE" dirty="0"/>
+          </a:p>
+          <a:p>
+            <a:r>
+              <a:rPr lang="de-DE" dirty="0"/>
+              <a:t>Events </a:t>
+            </a:r>
+            <a:r>
+              <a:rPr lang="de-DE" dirty="0" err="1"/>
+              <a:t>focus</a:t>
+            </a:r>
+            <a:r>
+              <a:rPr lang="de-DE" dirty="0"/>
+              <a:t>/</a:t>
+            </a:r>
+            <a:r>
+              <a:rPr lang="de-DE" dirty="0" err="1"/>
+              <a:t>blur</a:t>
+            </a:r>
+            <a:endParaRPr lang="de-DE" dirty="0"/>
+          </a:p>
+          <a:p>
+            <a:pPr lvl="1"/>
+            <a:r>
+              <a:rPr lang="en-US" dirty="0"/>
+              <a:t>The focus event is called on focusing, and blur – when the element loses the focus. </a:t>
+            </a:r>
+          </a:p>
+          <a:p>
+            <a:pPr marL="457200" lvl="1" indent="0">
+              <a:buNone/>
+            </a:pPr>
+            <a:endParaRPr lang="de-DE" dirty="0"/>
+          </a:p>
+          <a:p>
+            <a:pPr marL="0" indent="0">
+              <a:buNone/>
+            </a:pPr>
             <a:endParaRPr lang="de-DE" dirty="0"/>
           </a:p>
         </p:txBody>

</xml_diff>

<commit_message>
Implemented upload of profile picture to IBM Cloud Object Storage and storage of image reference in Cloudant
</commit_message>
<xml_diff>
--- a/documentation/presentation/Präsentation_Using_Cloud_Services.pptx
+++ b/documentation/presentation/Präsentation_Using_Cloud_Services.pptx
@@ -5,15 +5,17 @@
     <p:sldMasterId id="2147483648" r:id="rId1"/>
   </p:sldMasterIdLst>
   <p:notesMasterIdLst>
-    <p:notesMasterId r:id="rId8"/>
+    <p:notesMasterId r:id="rId10"/>
   </p:notesMasterIdLst>
   <p:sldIdLst>
     <p:sldId id="256" r:id="rId2"/>
     <p:sldId id="257" r:id="rId3"/>
-    <p:sldId id="263" r:id="rId4"/>
-    <p:sldId id="260" r:id="rId5"/>
-    <p:sldId id="264" r:id="rId6"/>
-    <p:sldId id="265" r:id="rId7"/>
+    <p:sldId id="266" r:id="rId4"/>
+    <p:sldId id="267" r:id="rId5"/>
+    <p:sldId id="263" r:id="rId6"/>
+    <p:sldId id="260" r:id="rId7"/>
+    <p:sldId id="264" r:id="rId8"/>
+    <p:sldId id="265" r:id="rId9"/>
   </p:sldIdLst>
   <p:sldSz cx="12192000" cy="6858000"/>
   <p:notesSz cx="6858000" cy="9144000"/>
@@ -214,7 +216,7 @@
           <a:p>
             <a:fld id="{B3654C23-CE4E-42B1-99EC-1DAD68CD7927}" type="datetimeFigureOut">
               <a:rPr lang="de-DE" smtClean="0"/>
-              <a:t>22.05.2019</a:t>
+              <a:t>23.05.19</a:t>
             </a:fld>
             <a:endParaRPr lang="de-DE"/>
           </a:p>
@@ -372,7 +374,7 @@
           <a:p>
             <a:fld id="{230C00E6-BC4A-4059-92D1-BF2522470C95}" type="slidenum">
               <a:rPr lang="de-DE" smtClean="0"/>
-              <a:t>‹Nr.›</a:t>
+              <a:t>‹#›</a:t>
             </a:fld>
             <a:endParaRPr lang="de-DE"/>
           </a:p>
@@ -695,7 +697,7 @@
           <a:p>
             <a:fld id="{230C00E6-BC4A-4059-92D1-BF2522470C95}" type="slidenum">
               <a:rPr lang="de-DE" smtClean="0"/>
-              <a:t>3</a:t>
+              <a:t>5</a:t>
             </a:fld>
             <a:endParaRPr lang="de-DE"/>
           </a:p>
@@ -779,7 +781,7 @@
           <a:p>
             <a:fld id="{230C00E6-BC4A-4059-92D1-BF2522470C95}" type="slidenum">
               <a:rPr lang="de-DE" smtClean="0"/>
-              <a:t>4</a:t>
+              <a:t>6</a:t>
             </a:fld>
             <a:endParaRPr lang="de-DE"/>
           </a:p>
@@ -1289,7 +1291,7 @@
           <a:p>
             <a:fld id="{230C00E6-BC4A-4059-92D1-BF2522470C95}" type="slidenum">
               <a:rPr lang="de-DE" smtClean="0"/>
-              <a:t>5</a:t>
+              <a:t>7</a:t>
             </a:fld>
             <a:endParaRPr lang="de-DE"/>
           </a:p>
@@ -1955,7 +1957,7 @@
             <a:fld id="{1E700B27-DE4C-4B9E-BB11-B9027034A00F}" type="datetimeFigureOut">
               <a:rPr lang="en-US" dirty="0"/>
               <a:pPr/>
-              <a:t>5/22/2019</a:t>
+              <a:t>5/23/19</a:t>
             </a:fld>
             <a:endParaRPr lang="en-US" dirty="0"/>
           </a:p>
@@ -2062,7 +2064,7 @@
             <a:fld id="{D57F1E4F-1CFF-5643-939E-217C01CDF565}" type="slidenum">
               <a:rPr lang="en-US" dirty="0"/>
               <a:pPr/>
-              <a:t>‹Nr.›</a:t>
+              <a:t>‹#›</a:t>
             </a:fld>
             <a:endParaRPr lang="en-US" dirty="0"/>
           </a:p>
@@ -3075,7 +3077,7 @@
           <a:p>
             <a:fld id="{C40F4739-9812-4A9F-890D-2AD6BA5F6EE8}" type="datetimeFigureOut">
               <a:rPr lang="en-US" dirty="0"/>
-              <a:t>5/22/2019</a:t>
+              <a:t>5/23/19</a:t>
             </a:fld>
             <a:endParaRPr lang="en-US" dirty="0"/>
           </a:p>
@@ -3158,7 +3160,7 @@
             <a:fld id="{D57F1E4F-1CFF-5643-939E-217C01CDF565}" type="slidenum">
               <a:rPr lang="en-US" dirty="0"/>
               <a:pPr/>
-              <a:t>‹Nr.›</a:t>
+              <a:t>‹#›</a:t>
             </a:fld>
             <a:endParaRPr lang="en-US" dirty="0"/>
           </a:p>
@@ -4086,7 +4088,7 @@
           <a:p>
             <a:fld id="{18845AC5-A3F8-44AA-BA8F-596CDCC976D3}" type="datetimeFigureOut">
               <a:rPr lang="en-US" dirty="0"/>
-              <a:t>5/22/2019</a:t>
+              <a:t>5/23/19</a:t>
             </a:fld>
             <a:endParaRPr lang="en-US" dirty="0"/>
           </a:p>
@@ -4169,7 +4171,7 @@
             <a:fld id="{D57F1E4F-1CFF-5643-939E-217C01CDF565}" type="slidenum">
               <a:rPr lang="en-US" dirty="0"/>
               <a:pPr/>
-              <a:t>‹Nr.›</a:t>
+              <a:t>‹#›</a:t>
             </a:fld>
             <a:endParaRPr lang="en-US" dirty="0"/>
           </a:p>
@@ -5256,7 +5258,7 @@
           <a:p>
             <a:fld id="{C873B183-A821-4095-A363-9EC968635539}" type="datetimeFigureOut">
               <a:rPr lang="en-US" dirty="0"/>
-              <a:t>5/22/2019</a:t>
+              <a:t>5/23/19</a:t>
             </a:fld>
             <a:endParaRPr lang="en-US" dirty="0"/>
           </a:p>
@@ -5339,7 +5341,7 @@
             <a:fld id="{D57F1E4F-1CFF-5643-939E-217C01CDF565}" type="slidenum">
               <a:rPr lang="en-US" dirty="0"/>
               <a:pPr/>
-              <a:t>‹Nr.›</a:t>
+              <a:t>‹#›</a:t>
             </a:fld>
             <a:endParaRPr lang="en-US" dirty="0"/>
           </a:p>
@@ -6317,7 +6319,7 @@
           <a:p>
             <a:fld id="{174D01B4-0AA5-45E6-B2E6-5FA4078AEBCF}" type="datetimeFigureOut">
               <a:rPr lang="en-US" dirty="0"/>
-              <a:t>5/22/2019</a:t>
+              <a:t>5/23/19</a:t>
             </a:fld>
             <a:endParaRPr lang="en-US" dirty="0"/>
           </a:p>
@@ -6400,7 +6402,7 @@
             <a:fld id="{D57F1E4F-1CFF-5643-939E-217C01CDF565}" type="slidenum">
               <a:rPr lang="en-US" dirty="0"/>
               <a:pPr/>
-              <a:t>‹Nr.›</a:t>
+              <a:t>‹#›</a:t>
             </a:fld>
             <a:endParaRPr lang="en-US" dirty="0"/>
           </a:p>
@@ -6963,7 +6965,7 @@
           <a:p>
             <a:fld id="{4147335C-0450-40D7-8612-B3203BED4F28}" type="datetimeFigureOut">
               <a:rPr lang="en-US" dirty="0"/>
-              <a:t>5/22/2019</a:t>
+              <a:t>5/23/19</a:t>
             </a:fld>
             <a:endParaRPr lang="en-US" dirty="0"/>
           </a:p>
@@ -7010,7 +7012,7 @@
             <a:fld id="{D57F1E4F-1CFF-5643-939E-217C01CDF565}" type="slidenum">
               <a:rPr lang="en-US" dirty="0"/>
               <a:pPr/>
-              <a:t>‹Nr.›</a:t>
+              <a:t>‹#›</a:t>
             </a:fld>
             <a:endParaRPr lang="en-US" dirty="0"/>
           </a:p>
@@ -7810,7 +7812,7 @@
           <a:p>
             <a:fld id="{D246A105-2A1C-4284-B4EA-07CF89B1A393}" type="datetimeFigureOut">
               <a:rPr lang="en-US" dirty="0"/>
-              <a:t>5/22/2019</a:t>
+              <a:t>5/23/19</a:t>
             </a:fld>
             <a:endParaRPr lang="en-US" dirty="0"/>
           </a:p>
@@ -7857,7 +7859,7 @@
             <a:fld id="{D57F1E4F-1CFF-5643-939E-217C01CDF565}" type="slidenum">
               <a:rPr lang="en-US" dirty="0"/>
               <a:pPr/>
-              <a:t>‹Nr.›</a:t>
+              <a:t>‹#›</a:t>
             </a:fld>
             <a:endParaRPr lang="en-US" dirty="0"/>
           </a:p>
@@ -7985,7 +7987,7 @@
           <a:p>
             <a:fld id="{80DBE609-F3F2-45E6-BD6A-E03A8C86C1AE}" type="datetimeFigureOut">
               <a:rPr lang="en-US" dirty="0"/>
-              <a:t>5/22/2019</a:t>
+              <a:t>5/23/19</a:t>
             </a:fld>
             <a:endParaRPr lang="en-US" dirty="0"/>
           </a:p>
@@ -8032,7 +8034,7 @@
             <a:fld id="{D57F1E4F-1CFF-5643-939E-217C01CDF565}" type="slidenum">
               <a:rPr lang="en-US" dirty="0"/>
               <a:pPr/>
-              <a:t>‹Nr.›</a:t>
+              <a:t>‹#›</a:t>
             </a:fld>
             <a:endParaRPr lang="en-US" dirty="0"/>
           </a:p>
@@ -8983,7 +8985,7 @@
           <a:p>
             <a:fld id="{7A24AD68-089C-4467-A8F3-EA2BBCA6B44E}" type="datetimeFigureOut">
               <a:rPr lang="en-US" dirty="0"/>
-              <a:t>5/22/2019</a:t>
+              <a:t>5/23/19</a:t>
             </a:fld>
             <a:endParaRPr lang="en-US" dirty="0"/>
           </a:p>
@@ -9066,7 +9068,7 @@
             <a:fld id="{D57F1E4F-1CFF-5643-939E-217C01CDF565}" type="slidenum">
               <a:rPr lang="en-US" dirty="0"/>
               <a:pPr/>
-              <a:t>‹Nr.›</a:t>
+              <a:t>‹#›</a:t>
             </a:fld>
             <a:endParaRPr lang="en-US" dirty="0"/>
           </a:p>
@@ -9189,7 +9191,7 @@
           <a:p>
             <a:fld id="{75C51FCE-E4BB-4680-8E50-3C0E348D2609}" type="datetimeFigureOut">
               <a:rPr lang="en-US" dirty="0"/>
-              <a:t>5/22/2019</a:t>
+              <a:t>5/23/19</a:t>
             </a:fld>
             <a:endParaRPr lang="en-US" dirty="0"/>
           </a:p>
@@ -9236,7 +9238,7 @@
             <a:fld id="{D57F1E4F-1CFF-5643-939E-217C01CDF565}" type="slidenum">
               <a:rPr lang="en-US" dirty="0"/>
               <a:pPr/>
-              <a:t>‹Nr.›</a:t>
+              <a:t>‹#›</a:t>
             </a:fld>
             <a:endParaRPr lang="en-US" dirty="0"/>
           </a:p>
@@ -10251,7 +10253,7 @@
           <a:p>
             <a:fld id="{8AAA073D-A903-47F8-8D16-77642FB0DF1F}" type="datetimeFigureOut">
               <a:rPr lang="en-US" dirty="0"/>
-              <a:t>5/22/2019</a:t>
+              <a:t>5/23/19</a:t>
             </a:fld>
             <a:endParaRPr lang="en-US" dirty="0"/>
           </a:p>
@@ -10334,7 +10336,7 @@
             <a:fld id="{D57F1E4F-1CFF-5643-939E-217C01CDF565}" type="slidenum">
               <a:rPr lang="en-US" dirty="0"/>
               <a:pPr/>
-              <a:t>‹Nr.›</a:t>
+              <a:t>‹#›</a:t>
             </a:fld>
             <a:endParaRPr lang="en-US" dirty="0"/>
           </a:p>
@@ -10523,7 +10525,7 @@
           <a:p>
             <a:fld id="{AB91FA40-626B-4CA1-85D0-7A9016E395BA}" type="datetimeFigureOut">
               <a:rPr lang="en-US" dirty="0"/>
-              <a:t>5/22/2019</a:t>
+              <a:t>5/23/19</a:t>
             </a:fld>
             <a:endParaRPr lang="en-US" dirty="0"/>
           </a:p>
@@ -10570,7 +10572,7 @@
             <a:fld id="{D57F1E4F-1CFF-5643-939E-217C01CDF565}" type="slidenum">
               <a:rPr lang="en-US" dirty="0"/>
               <a:pPr/>
-              <a:t>‹Nr.›</a:t>
+              <a:t>‹#›</a:t>
             </a:fld>
             <a:endParaRPr lang="en-US" dirty="0"/>
           </a:p>
@@ -10905,7 +10907,7 @@
           <a:p>
             <a:fld id="{C3F425EA-B9DC-48A7-991E-9A82573B1B21}" type="datetimeFigureOut">
               <a:rPr lang="en-US" dirty="0"/>
-              <a:t>5/22/2019</a:t>
+              <a:t>5/23/19</a:t>
             </a:fld>
             <a:endParaRPr lang="en-US" dirty="0"/>
           </a:p>
@@ -10952,7 +10954,7 @@
             <a:fld id="{D57F1E4F-1CFF-5643-939E-217C01CDF565}" type="slidenum">
               <a:rPr lang="en-US" dirty="0"/>
               <a:pPr/>
-              <a:t>‹Nr.›</a:t>
+              <a:t>‹#›</a:t>
             </a:fld>
             <a:endParaRPr lang="en-US" dirty="0"/>
           </a:p>
@@ -11023,7 +11025,7 @@
           <a:p>
             <a:fld id="{66CB97F8-6CEB-469B-AFCC-889F2A2B1D5A}" type="datetimeFigureOut">
               <a:rPr lang="en-US" dirty="0"/>
-              <a:t>5/22/2019</a:t>
+              <a:t>5/23/19</a:t>
             </a:fld>
             <a:endParaRPr lang="en-US" dirty="0"/>
           </a:p>
@@ -11070,7 +11072,7 @@
             <a:fld id="{D57F1E4F-1CFF-5643-939E-217C01CDF565}" type="slidenum">
               <a:rPr lang="en-US" dirty="0"/>
               <a:pPr/>
-              <a:t>‹Nr.›</a:t>
+              <a:t>‹#›</a:t>
             </a:fld>
             <a:endParaRPr lang="en-US" dirty="0"/>
           </a:p>
@@ -11118,7 +11120,7 @@
           <a:p>
             <a:fld id="{8FA9179F-009E-4FA5-B091-7EBB82A185BD}" type="datetimeFigureOut">
               <a:rPr lang="en-US" dirty="0"/>
-              <a:t>5/22/2019</a:t>
+              <a:t>5/23/19</a:t>
             </a:fld>
             <a:endParaRPr lang="en-US" dirty="0"/>
           </a:p>
@@ -11201,7 +11203,7 @@
             <a:fld id="{D57F1E4F-1CFF-5643-939E-217C01CDF565}" type="slidenum">
               <a:rPr lang="en-US" dirty="0"/>
               <a:pPr/>
-              <a:t>‹Nr.›</a:t>
+              <a:t>‹#›</a:t>
             </a:fld>
             <a:endParaRPr lang="en-US" dirty="0"/>
           </a:p>
@@ -12227,7 +12229,7 @@
           <a:p>
             <a:fld id="{8E665CEB-0076-4E37-B880-BCEA9784DE0A}" type="datetimeFigureOut">
               <a:rPr lang="en-US" dirty="0"/>
-              <a:t>5/22/2019</a:t>
+              <a:t>5/23/19</a:t>
             </a:fld>
             <a:endParaRPr lang="en-US" dirty="0"/>
           </a:p>
@@ -12310,7 +12312,7 @@
             <a:fld id="{D57F1E4F-1CFF-5643-939E-217C01CDF565}" type="slidenum">
               <a:rPr lang="en-US" dirty="0"/>
               <a:pPr/>
-              <a:t>‹Nr.›</a:t>
+              <a:t>‹#›</a:t>
             </a:fld>
             <a:endParaRPr lang="en-US" dirty="0"/>
           </a:p>
@@ -13360,7 +13362,7 @@
           <a:p>
             <a:fld id="{A6149E5E-3896-4118-99A7-7B85668F1C5E}" type="datetimeFigureOut">
               <a:rPr lang="en-US" dirty="0"/>
-              <a:t>5/22/2019</a:t>
+              <a:t>5/23/19</a:t>
             </a:fld>
             <a:endParaRPr lang="en-US" dirty="0"/>
           </a:p>
@@ -13443,7 +13445,7 @@
             <a:fld id="{D57F1E4F-1CFF-5643-939E-217C01CDF565}" type="slidenum">
               <a:rPr lang="en-US" dirty="0"/>
               <a:pPr/>
-              <a:t>‹Nr.›</a:t>
+              <a:t>‹#›</a:t>
             </a:fld>
             <a:endParaRPr lang="en-US" dirty="0"/>
           </a:p>
@@ -14388,7 +14390,7 @@
           <a:p>
             <a:fld id="{7E0D914D-B099-4142-A885-11F276715148}" type="datetimeFigureOut">
               <a:rPr lang="en-US" dirty="0"/>
-              <a:t>5/22/2019</a:t>
+              <a:t>5/23/19</a:t>
             </a:fld>
             <a:endParaRPr lang="en-US" dirty="0"/>
           </a:p>
@@ -14505,7 +14507,7 @@
             <a:fld id="{D57F1E4F-1CFF-5643-939E-217C01CDF565}" type="slidenum">
               <a:rPr lang="en-US" dirty="0"/>
               <a:pPr/>
-              <a:t>‹Nr.›</a:t>
+              <a:t>‹#›</a:t>
             </a:fld>
             <a:endParaRPr lang="en-US" dirty="0"/>
           </a:p>
@@ -15323,6 +15325,238 @@
       </p:grpSpPr>
       <p:sp>
         <p:nvSpPr>
+          <p:cNvPr id="2" name="Title 1">
+            <a:extLst>
+              <a:ext uri="{FF2B5EF4-FFF2-40B4-BE49-F238E27FC236}">
+                <a16:creationId xmlns:a16="http://schemas.microsoft.com/office/drawing/2014/main" id="{6D3C02F3-1DED-5642-AF41-3F0C0B5DD428}"/>
+              </a:ext>
+            </a:extLst>
+          </p:cNvPr>
+          <p:cNvSpPr>
+            <a:spLocks noGrp="1"/>
+          </p:cNvSpPr>
+          <p:nvPr>
+            <p:ph type="title"/>
+          </p:nvPr>
+        </p:nvSpPr>
+        <p:spPr/>
+        <p:txBody>
+          <a:bodyPr/>
+          <a:lstStyle/>
+          <a:p>
+            <a:r>
+              <a:rPr lang="de-DE" dirty="0"/>
+              <a:t>Mozilla Observatory – Frontend</a:t>
+            </a:r>
+          </a:p>
+        </p:txBody>
+      </p:sp>
+      <p:pic>
+        <p:nvPicPr>
+          <p:cNvPr id="6" name="Content Placeholder 5">
+            <a:extLst>
+              <a:ext uri="{FF2B5EF4-FFF2-40B4-BE49-F238E27FC236}">
+                <a16:creationId xmlns:a16="http://schemas.microsoft.com/office/drawing/2014/main" id="{CC1524DD-D9C3-0A48-BD40-870842A2D67F}"/>
+              </a:ext>
+            </a:extLst>
+          </p:cNvPr>
+          <p:cNvPicPr>
+            <a:picLocks noGrp="1" noChangeAspect="1"/>
+          </p:cNvPicPr>
+          <p:nvPr>
+            <p:ph sz="half" idx="1"/>
+          </p:nvPr>
+        </p:nvPicPr>
+        <p:blipFill>
+          <a:blip r:embed="rId2"/>
+          <a:stretch>
+            <a:fillRect/>
+          </a:stretch>
+        </p:blipFill>
+        <p:spPr>
+          <a:xfrm>
+            <a:off x="1111475" y="2432685"/>
+            <a:ext cx="4912863" cy="3757930"/>
+          </a:xfrm>
+        </p:spPr>
+      </p:pic>
+      <p:pic>
+        <p:nvPicPr>
+          <p:cNvPr id="8" name="Content Placeholder 7">
+            <a:extLst>
+              <a:ext uri="{FF2B5EF4-FFF2-40B4-BE49-F238E27FC236}">
+                <a16:creationId xmlns:a16="http://schemas.microsoft.com/office/drawing/2014/main" id="{9E22F881-AC3E-2A42-990E-80E710B4A152}"/>
+              </a:ext>
+            </a:extLst>
+          </p:cNvPr>
+          <p:cNvPicPr>
+            <a:picLocks noGrp="1" noChangeAspect="1"/>
+          </p:cNvPicPr>
+          <p:nvPr>
+            <p:ph sz="half" idx="2"/>
+          </p:nvPr>
+        </p:nvPicPr>
+        <p:blipFill>
+          <a:blip r:embed="rId3"/>
+          <a:stretch>
+            <a:fillRect/>
+          </a:stretch>
+        </p:blipFill>
+        <p:spPr>
+          <a:xfrm>
+            <a:off x="6216529" y="2432685"/>
+            <a:ext cx="4808779" cy="3757930"/>
+          </a:xfrm>
+        </p:spPr>
+      </p:pic>
+    </p:spTree>
+    <p:extLst>
+      <p:ext uri="{BB962C8B-B14F-4D97-AF65-F5344CB8AC3E}">
+        <p14:creationId xmlns:p14="http://schemas.microsoft.com/office/powerpoint/2010/main" val="1089523151"/>
+      </p:ext>
+    </p:extLst>
+  </p:cSld>
+  <p:clrMapOvr>
+    <a:masterClrMapping/>
+  </p:clrMapOvr>
+</p:sld>
+</file>
+
+<file path=ppt/slides/slide4.xml><?xml version="1.0" encoding="utf-8"?>
+<p:sld xmlns:a="http://schemas.openxmlformats.org/drawingml/2006/main" xmlns:r="http://schemas.openxmlformats.org/officeDocument/2006/relationships" xmlns:p="http://schemas.openxmlformats.org/presentationml/2006/main">
+  <p:cSld>
+    <p:spTree>
+      <p:nvGrpSpPr>
+        <p:cNvPr id="1" name=""/>
+        <p:cNvGrpSpPr/>
+        <p:nvPr/>
+      </p:nvGrpSpPr>
+      <p:grpSpPr>
+        <a:xfrm>
+          <a:off x="0" y="0"/>
+          <a:ext cx="0" cy="0"/>
+          <a:chOff x="0" y="0"/>
+          <a:chExt cx="0" cy="0"/>
+        </a:xfrm>
+      </p:grpSpPr>
+      <p:sp>
+        <p:nvSpPr>
+          <p:cNvPr id="2" name="Title 1">
+            <a:extLst>
+              <a:ext uri="{FF2B5EF4-FFF2-40B4-BE49-F238E27FC236}">
+                <a16:creationId xmlns:a16="http://schemas.microsoft.com/office/drawing/2014/main" id="{9DAD0284-D7CC-3F40-AAEB-E38D3A7224AD}"/>
+              </a:ext>
+            </a:extLst>
+          </p:cNvPr>
+          <p:cNvSpPr>
+            <a:spLocks noGrp="1"/>
+          </p:cNvSpPr>
+          <p:nvPr>
+            <p:ph type="title"/>
+          </p:nvPr>
+        </p:nvSpPr>
+        <p:spPr/>
+        <p:txBody>
+          <a:bodyPr/>
+          <a:lstStyle/>
+          <a:p>
+            <a:r>
+              <a:rPr lang="de-DE" dirty="0"/>
+              <a:t>Mozilla Observatory – Frontend</a:t>
+            </a:r>
+          </a:p>
+        </p:txBody>
+      </p:sp>
+      <p:pic>
+        <p:nvPicPr>
+          <p:cNvPr id="6" name="Content Placeholder 5">
+            <a:extLst>
+              <a:ext uri="{FF2B5EF4-FFF2-40B4-BE49-F238E27FC236}">
+                <a16:creationId xmlns:a16="http://schemas.microsoft.com/office/drawing/2014/main" id="{AC00BE06-78A0-EB46-B098-16EDCF3B5C78}"/>
+              </a:ext>
+            </a:extLst>
+          </p:cNvPr>
+          <p:cNvPicPr>
+            <a:picLocks noGrp="1" noChangeAspect="1"/>
+          </p:cNvPicPr>
+          <p:nvPr>
+            <p:ph sz="half" idx="1"/>
+          </p:nvPr>
+        </p:nvPicPr>
+        <p:blipFill>
+          <a:blip r:embed="rId2"/>
+          <a:stretch>
+            <a:fillRect/>
+          </a:stretch>
+        </p:blipFill>
+        <p:spPr>
+          <a:xfrm>
+            <a:off x="771778" y="2328804"/>
+            <a:ext cx="5242939" cy="4114554"/>
+          </a:xfrm>
+        </p:spPr>
+      </p:pic>
+      <p:pic>
+        <p:nvPicPr>
+          <p:cNvPr id="8" name="Content Placeholder 7">
+            <a:extLst>
+              <a:ext uri="{FF2B5EF4-FFF2-40B4-BE49-F238E27FC236}">
+                <a16:creationId xmlns:a16="http://schemas.microsoft.com/office/drawing/2014/main" id="{D1693B0B-344F-7946-BBBC-9F3CDBB6DB8C}"/>
+              </a:ext>
+            </a:extLst>
+          </p:cNvPr>
+          <p:cNvPicPr>
+            <a:picLocks noGrp="1" noChangeAspect="1"/>
+          </p:cNvPicPr>
+          <p:nvPr>
+            <p:ph sz="half" idx="2"/>
+          </p:nvPr>
+        </p:nvPicPr>
+        <p:blipFill>
+          <a:blip r:embed="rId3"/>
+          <a:stretch>
+            <a:fillRect/>
+          </a:stretch>
+        </p:blipFill>
+        <p:spPr>
+          <a:xfrm>
+            <a:off x="6169339" y="2122118"/>
+            <a:ext cx="4903159" cy="4547095"/>
+          </a:xfrm>
+        </p:spPr>
+      </p:pic>
+    </p:spTree>
+    <p:extLst>
+      <p:ext uri="{BB962C8B-B14F-4D97-AF65-F5344CB8AC3E}">
+        <p14:creationId xmlns:p14="http://schemas.microsoft.com/office/powerpoint/2010/main" val="1121987381"/>
+      </p:ext>
+    </p:extLst>
+  </p:cSld>
+  <p:clrMapOvr>
+    <a:masterClrMapping/>
+  </p:clrMapOvr>
+</p:sld>
+</file>
+
+<file path=ppt/slides/slide5.xml><?xml version="1.0" encoding="utf-8"?>
+<p:sld xmlns:a="http://schemas.openxmlformats.org/drawingml/2006/main" xmlns:r="http://schemas.openxmlformats.org/officeDocument/2006/relationships" xmlns:p="http://schemas.openxmlformats.org/presentationml/2006/main">
+  <p:cSld>
+    <p:spTree>
+      <p:nvGrpSpPr>
+        <p:cNvPr id="1" name=""/>
+        <p:cNvGrpSpPr/>
+        <p:nvPr/>
+      </p:nvGrpSpPr>
+      <p:grpSpPr>
+        <a:xfrm>
+          <a:off x="0" y="0"/>
+          <a:ext cx="0" cy="0"/>
+          <a:chOff x="0" y="0"/>
+          <a:chExt cx="0" cy="0"/>
+        </a:xfrm>
+      </p:grpSpPr>
+      <p:sp>
+        <p:nvSpPr>
           <p:cNvPr id="2" name="Titel 1"/>
           <p:cNvSpPr>
             <a:spLocks noGrp="1"/>
@@ -15577,7 +15811,7 @@
 </p:sld>
 </file>
 
-<file path=ppt/slides/slide4.xml><?xml version="1.0" encoding="utf-8"?>
+<file path=ppt/slides/slide6.xml><?xml version="1.0" encoding="utf-8"?>
 <p:sld xmlns:a="http://schemas.openxmlformats.org/drawingml/2006/main" xmlns:r="http://schemas.openxmlformats.org/officeDocument/2006/relationships" xmlns:p="http://schemas.openxmlformats.org/presentationml/2006/main">
   <p:cSld>
     <p:spTree>
@@ -15664,7 +15898,7 @@
 </p:sld>
 </file>
 
-<file path=ppt/slides/slide5.xml><?xml version="1.0" encoding="utf-8"?>
+<file path=ppt/slides/slide7.xml><?xml version="1.0" encoding="utf-8"?>
 <p:sld xmlns:a="http://schemas.openxmlformats.org/drawingml/2006/main" xmlns:r="http://schemas.openxmlformats.org/officeDocument/2006/relationships" xmlns:p="http://schemas.openxmlformats.org/presentationml/2006/main">
   <p:cSld>
     <p:spTree>
@@ -15857,7 +16091,7 @@
 </p:sld>
 </file>
 
-<file path=ppt/slides/slide6.xml><?xml version="1.0" encoding="utf-8"?>
+<file path=ppt/slides/slide8.xml><?xml version="1.0" encoding="utf-8"?>
 <p:sld xmlns:a="http://schemas.openxmlformats.org/drawingml/2006/main" xmlns:r="http://schemas.openxmlformats.org/officeDocument/2006/relationships" xmlns:p="http://schemas.openxmlformats.org/presentationml/2006/main">
   <p:cSld>
     <p:spTree>

</xml_diff>